<commit_message>
updating Session 2 notes
</commit_message>
<xml_diff>
--- a/Chanco_STA6206_BDA_2019_Henrion_Session2.pptx
+++ b/Chanco_STA6206_BDA_2019_Henrion_Session2.pptx
@@ -17271,6 +17271,24 @@
                   <a:t>You may struggle with the prior distribution: how do you decide what is a good prior distribution?</a:t>
                 </a:r>
               </a:p>
+              <a:p>
+                <a:pPr lvl="0" marL="0" indent="0">
+                  <a:buNone/>
+                </a:pPr>
+                <a:r>
+                  <a:rPr/>
+                  <a:t>A good solution is to ask experts in the field you are working in. You can even combine priors from several experts through a mixture distribution of priors and this also allows you to specify different weights for different expert.</a:t>
+                </a:r>
+              </a:p>
+              <a:p>
+                <a:pPr lvl="0" marL="0" indent="0">
+                  <a:buNone/>
+                </a:pPr>
+                <a:r>
+                  <a:rPr/>
+                  <a:t>However, experts are not always available…</a:t>
+                </a:r>
+              </a:p>
             </p:txBody>
           </p:sp>
         </mc:Choice>
@@ -17880,6 +17898,15 @@
                 </a:pPr>
                 <a:r>
                   <a:rPr/>
+                  <a:t>Note that assuming all possible values for a parameter to be equally likely is not, strictly speaking, equivalent to being completely ignorant.</a:t>
+                </a:r>
+              </a:p>
+              <a:p>
+                <a:pPr lvl="0" marL="0" indent="0">
+                  <a:buNone/>
+                </a:pPr>
+                <a:r>
+                  <a:rPr/>
                   <a:t>Note: Beta(1,1) = Uniform(0,1).</a:t>
                 </a:r>
               </a:p>
@@ -18008,7 +18035,7 @@
                 </a:pPr>
                 <a:r>
                   <a:rPr/>
-                  <a:t>How do you come up with a uninformative prior?</a:t>
+                  <a:t>How do you come up with a non-informative prior?</a:t>
                 </a:r>
               </a:p>
               <a:p>
@@ -18185,7 +18212,7 @@
                 </a:pPr>
                 <a:r>
                   <a:rPr/>
-                  <a:t>Sir Harold Jeffreys devised a general rule for generating an objective or noninformative priors for a sampling model </a:t>
+                  <a:t>Sir Harold Jeffreys devised a general rule for generating an objective or non-informative priors for a sampling model </a:t>
                 </a:r>
                 <a14:m>
                   <m:oMath xmlns:m="http://schemas.openxmlformats.org/officeDocument/2006/math">
@@ -18221,23 +18248,6 @@
                   <a:rPr/>
                   <a:t> is given by</a:t>
                 </a:r>
-              </a:p>
-              <a:p>
-                <a:pPr lvl="0" marL="0" indent="0">
-                  <a:buNone/>
-                </a:pPr>
-                <a14:m>
-                  <m:oMathPara xmlns:m="http://schemas.openxmlformats.org/officeDocument/2006/math">
-                    <m:oMathParaPr>
-                      <m:jc m:val="center"/>
-                    </m:oMathParaPr>
-                    <m:oMath>
-                      <m:r>
-                        <m:t> </m:t>
-                      </m:r>
-                    </m:oMath>
-                  </m:oMathPara>
-                </a14:m>
               </a:p>
               <a:p>
                 <a:pPr lvl="0" marL="0" indent="0">
@@ -18293,23 +18303,6 @@
                           </m:r>
                         </m:e>
                       </m:rad>
-                    </m:oMath>
-                  </m:oMathPara>
-                </a14:m>
-              </a:p>
-              <a:p>
-                <a:pPr lvl="0" marL="0" indent="0">
-                  <a:buNone/>
-                </a:pPr>
-                <a14:m>
-                  <m:oMathPara xmlns:m="http://schemas.openxmlformats.org/officeDocument/2006/math">
-                    <m:oMathParaPr>
-                      <m:jc m:val="center"/>
-                    </m:oMathParaPr>
-                    <m:oMath>
-                      <m:r>
-                        <m:t> </m:t>
-                      </m:r>
                     </m:oMath>
                   </m:oMathPara>
                 </a14:m>
@@ -18476,6 +18469,15 @@
                 <a:r>
                   <a:rPr/>
                   <a:t> (see practical).</a:t>
+                </a:r>
+              </a:p>
+              <a:p>
+                <a:pPr lvl="0" marL="0" indent="0">
+                  <a:buNone/>
+                </a:pPr>
+                <a:r>
+                  <a:rPr/>
+                  <a:t>An important property of Jeffreys priors is that they are invariant under transformation.</a:t>
                 </a:r>
               </a:p>
             </p:txBody>

</xml_diff>

<commit_message>
Session 2 -- now with typos corrected
</commit_message>
<xml_diff>
--- a/Chanco_STA6206_BDA_2019_Henrion_Session2.pptx
+++ b/Chanco_STA6206_BDA_2019_Henrion_Session2.pptx
@@ -4352,7 +4352,7 @@
                 </a:pPr>
                 <a:r>
                   <a:rPr/>
-                  <a:t>It is important to note that the denominator (the evidence) is fixed for a given dataset, i.e. it is constant. It normalises the posterior distrbiution so that it sums (pmf) / integrates (pdf) to 1 – this is a requirement for the posterior to be a valid probability distribution.</a:t>
+                  <a:t>It is important to note that the denominator (the evidence) is fixed for a given dataset, i.e. it is constant. It normalises the posterior distribution so that it sums (pmf), resp. integrates (pdf), to 1 – this is a requirement for the posterior to be a valid probability distribution.</a:t>
                 </a:r>
               </a:p>
               <a:p>
@@ -6948,7 +6948,7 @@
                                   <m:rPr>
                                     <m:sty m:val="p"/>
                                   </m:rPr>
-                                  <m:t>if</m:t>
+                                  <m:t>if </m:t>
                                 </m:r>
                                 <m:r>
                                   <m:t>k</m:t>
@@ -7901,7 +7901,7 @@
                       <m:t>=</m:t>
                     </m:r>
                     <m:r>
-                      <m:t>4</m:t>
+                      <m:t>2</m:t>
                     </m:r>
                     <m:r>
                       <m:t>)</m:t>
@@ -18972,7 +18972,7 @@
                                   </m:e>
                                   <m:sup>
                                     <m:r>
-                                      <m:t>x</m:t>
+                                      <m:t>y</m:t>
                                     </m:r>
                                   </m:sup>
                                 </m:sSup>
@@ -19174,9 +19174,6 @@
                               </m:num>
                               <m:den>
                                 <m:r>
-                                  <m:t>(</m:t>
-                                </m:r>
-                                <m:r>
                                   <m:t>1</m:t>
                                 </m:r>
                                 <m:r>
@@ -19185,18 +19182,6 @@
                                 <m:r>
                                   <m:t>θ</m:t>
                                 </m:r>
-                                <m:sSup>
-                                  <m:e>
-                                    <m:r>
-                                      <m:t>)</m:t>
-                                    </m:r>
-                                  </m:e>
-                                  <m:sup>
-                                    <m:r>
-                                      <m:t>2</m:t>
-                                    </m:r>
-                                  </m:sup>
-                                </m:sSup>
                               </m:den>
                             </m:f>
                           </m:e>
@@ -19338,6 +19323,9 @@
                         </m:num>
                         <m:den>
                           <m:r>
+                            <m:t>(</m:t>
+                          </m:r>
+                          <m:r>
                             <m:t>1</m:t>
                           </m:r>
                           <m:r>
@@ -19346,6 +19334,18 @@
                           <m:r>
                             <m:t>θ</m:t>
                           </m:r>
+                          <m:sSup>
+                            <m:e>
+                              <m:r>
+                                <m:t>)</m:t>
+                              </m:r>
+                            </m:e>
+                            <m:sup>
+                              <m:r>
+                                <m:t>2</m:t>
+                              </m:r>
+                            </m:sup>
+                          </m:sSup>
                         </m:den>
                       </m:f>
                     </m:oMath>
@@ -19528,7 +19528,7 @@
                             </m:fPr>
                             <m:num>
                               <m:r>
-                                <m:t>x</m:t>
+                                <m:t>y</m:t>
                               </m:r>
                             </m:num>
                             <m:den>
@@ -19957,10 +19957,10 @@
                             <m:t>(</m:t>
                           </m:r>
                           <m:r>
+                            <m:t>1</m:t>
+                          </m:r>
+                          <m:r>
                             <m:t>−</m:t>
-                          </m:r>
-                          <m:r>
-                            <m:t>1</m:t>
                           </m:r>
                           <m:r>
                             <m:t>θ</m:t>
@@ -20213,6 +20213,9 @@
                         </m:e>
                         <m:sup>
                           <m:r>
+                            <m:t>−</m:t>
+                          </m:r>
+                          <m:r>
                             <m:t>1</m:t>
                           </m:r>
                           <m:r>
@@ -20242,6 +20245,9 @@
                           </m:r>
                         </m:e>
                         <m:sup>
+                          <m:r>
+                            <m:t>−</m:t>
+                          </m:r>
                           <m:r>
                             <m:t>1</m:t>
                           </m:r>
@@ -20427,6 +20433,9 @@
                       </m:e>
                       <m:sup>
                         <m:r>
+                          <m:t>−</m:t>
+                        </m:r>
+                        <m:r>
                           <m:t>1</m:t>
                         </m:r>
                         <m:r>
@@ -20456,6 +20465,9 @@
                         </m:r>
                       </m:e>
                       <m:sup>
+                        <m:r>
+                          <m:t>−</m:t>
+                        </m:r>
                         <m:r>
                           <m:t>1</m:t>
                         </m:r>
@@ -23333,23 +23345,27 @@
                 </a:r>
                 <a14:m>
                   <m:oMath xmlns:m="http://schemas.openxmlformats.org/officeDocument/2006/math">
-                    <m:sSubSup>
+                    <m:sSup>
                       <m:e>
                         <m:r>
                           <m:t>λ</m:t>
                         </m:r>
                       </m:e>
-                      <m:sub>
-                        <m:r>
-                          <m:t>1</m:t>
-                        </m:r>
-                      </m:sub>
                       <m:sup>
-                        <m:r>
-                          <m:t>c</m:t>
-                        </m:r>
+                        <m:sSub>
+                          <m:e>
+                            <m:r>
+                              <m:t>c</m:t>
+                            </m:r>
+                          </m:e>
+                          <m:sub>
+                            <m:r>
+                              <m:t>1</m:t>
+                            </m:r>
+                          </m:sub>
+                        </m:sSub>
                       </m:sup>
-                    </m:sSubSup>
+                    </m:sSup>
                     <m:sSup>
                       <m:e>
                         <m:r>

</xml_diff>

<commit_message>
Further update to Session 2 notes
</commit_message>
<xml_diff>
--- a/Chanco_STA6206_BDA_2019_Henrion_Session2.pptx
+++ b/Chanco_STA6206_BDA_2019_Henrion_Session2.pptx
@@ -80,6 +80,10 @@
     <p:sldId id="328" r:id="rId74"/>
     <p:sldId id="329" r:id="rId75"/>
     <p:sldId id="330" r:id="rId76"/>
+    <p:sldId id="331" r:id="rId77"/>
+    <p:sldId id="332" r:id="rId78"/>
+    <p:sldId id="333" r:id="rId79"/>
+    <p:sldId id="334" r:id="rId80"/>
   </p:sldIdLst>
   <p:sldSz cx="12192000" cy="6858000"/>
   <p:notesSz cx="6858000" cy="9144000"/>
@@ -25929,10 +25933,44 @@
                 <a:pPr lvl="0" marL="0" indent="0">
                   <a:buNone/>
                 </a:pPr>
+                <a14:m>
+                  <m:oMathPara xmlns:m="http://schemas.openxmlformats.org/officeDocument/2006/math">
+                    <m:oMathParaPr>
+                      <m:jc m:val="center"/>
+                    </m:oMathParaPr>
+                    <m:oMath>
+                      <m:r>
+                        <m:t> </m:t>
+                      </m:r>
+                    </m:oMath>
+                  </m:oMathPara>
+                </a14:m>
+              </a:p>
+              <a:p>
+                <a:pPr lvl="0" marL="0" indent="0">
+                  <a:buNone/>
+                </a:pPr>
                 <a:r>
                   <a:rPr/>
                   <a:t>A general conjugate prior for a one-parameter exponential family sampling model is given by</a:t>
                 </a:r>
+              </a:p>
+              <a:p>
+                <a:pPr lvl="0" marL="0" indent="0">
+                  <a:buNone/>
+                </a:pPr>
+                <a14:m>
+                  <m:oMathPara xmlns:m="http://schemas.openxmlformats.org/officeDocument/2006/math">
+                    <m:oMathParaPr>
+                      <m:jc m:val="center"/>
+                    </m:oMathParaPr>
+                    <m:oMath>
+                      <m:r>
+                        <m:t> </m:t>
+                      </m:r>
+                    </m:oMath>
+                  </m:oMathPara>
+                </a14:m>
               </a:p>
               <a:p>
                 <a:pPr lvl="0" marL="0" indent="0">
@@ -26095,6 +26133,125 @@
                   </m:oMathPara>
                 </a14:m>
               </a:p>
+            </p:txBody>
+          </p:sp>
+        </mc:Choice>
+      </mc:AlternateContent>
+    </p:spTree>
+  </p:cSld>
+</p:sld>
+</file>
+
+<file path=ppt/slides/slide74.xml><?xml version="1.0" encoding="utf-8"?>
+<p:sld xmlns:a="http://schemas.openxmlformats.org/drawingml/2006/main" xmlns:r="http://schemas.openxmlformats.org/officeDocument/2006/relationships" xmlns:p="http://schemas.openxmlformats.org/presentationml/2006/main">
+  <p:cSld>
+    <p:spTree>
+      <p:nvGrpSpPr>
+        <p:cNvPr id="1" name=""/>
+        <p:cNvGrpSpPr/>
+        <p:nvPr/>
+      </p:nvGrpSpPr>
+      <p:grpSpPr>
+        <a:xfrm>
+          <a:off x="0" y="0"/>
+          <a:ext cx="0" cy="0"/>
+          <a:chOff x="0" y="0"/>
+          <a:chExt cx="0" cy="0"/>
+        </a:xfrm>
+      </p:grpSpPr>
+      <p:sp>
+        <p:nvSpPr>
+          <p:cNvPr id="2" name="Title 1">
+            <a:extLst>
+              <a:ext uri="{FF2B5EF4-FFF2-40B4-BE49-F238E27FC236}">
+                <a16:creationId xmlns:a16="http://schemas.microsoft.com/office/drawing/2014/main" id="{D6AA89D5-560C-4369-A313-7C24EDF028A0}"/>
+              </a:ext>
+            </a:extLst>
+          </p:cNvPr>
+          <p:cNvSpPr>
+            <a:spLocks noGrp="1"/>
+          </p:cNvSpPr>
+          <p:nvPr>
+            <p:ph type="title"/>
+          </p:nvPr>
+        </p:nvSpPr>
+        <p:spPr/>
+        <p:txBody>
+          <a:bodyPr/>
+          <a:lstStyle/>
+          <a:p>
+            <a:pPr lvl="0" marL="0" indent="0">
+              <a:buNone/>
+            </a:pPr>
+            <a:r>
+              <a:rPr/>
+              <a:t>Conjugate</a:t>
+            </a:r>
+            <a:r>
+              <a:rPr/>
+              <a:t> </a:t>
+            </a:r>
+            <a:r>
+              <a:rPr/>
+              <a:t>priors</a:t>
+            </a:r>
+            <a:r>
+              <a:rPr/>
+              <a:t> </a:t>
+            </a:r>
+            <a:r>
+              <a:rPr/>
+              <a:t>for</a:t>
+            </a:r>
+            <a:r>
+              <a:rPr/>
+              <a:t> </a:t>
+            </a:r>
+            <a:r>
+              <a:rPr/>
+              <a:t>exponential</a:t>
+            </a:r>
+            <a:r>
+              <a:rPr/>
+              <a:t> </a:t>
+            </a:r>
+            <a:r>
+              <a:rPr/>
+              <a:t>family</a:t>
+            </a:r>
+            <a:r>
+              <a:rPr/>
+              <a:t> </a:t>
+            </a:r>
+            <a:r>
+              <a:rPr/>
+              <a:t>distributions</a:t>
+            </a:r>
+          </a:p>
+        </p:txBody>
+      </p:sp>
+      <mc:AlternateContent xmlns:mc="http://schemas.openxmlformats.org/markup-compatibility/2006">
+        <mc:Choice xmlns:a14="http://schemas.microsoft.com/office/drawing/2010/main" Requires="a14">
+          <p:sp>
+            <p:nvSpPr>
+              <p:cNvPr id="3" name="Content Placeholder 2">
+                <a:extLst>
+                  <a:ext uri="{FF2B5EF4-FFF2-40B4-BE49-F238E27FC236}">
+                    <a16:creationId xmlns:a16="http://schemas.microsoft.com/office/drawing/2014/main" id="{288BC91F-1C76-43AE-8B2A-956D48B768BE}"/>
+                  </a:ext>
+                </a:extLst>
+              </p:cNvPr>
+              <p:cNvSpPr>
+                <a:spLocks noGrp="1"/>
+              </p:cNvSpPr>
+              <p:nvPr>
+                <p:ph idx="1"/>
+              </p:nvPr>
+            </p:nvSpPr>
+            <p:spPr/>
+            <p:txBody>
+              <a:bodyPr/>
+              <a:lstStyle/>
               <a:p>
                 <a:pPr lvl="0" marL="0" indent="0">
                   <a:buNone/>
@@ -26589,6 +26746,23 @@
                 <a:pPr lvl="0" marL="0" indent="0">
                   <a:buNone/>
                 </a:pPr>
+                <a14:m>
+                  <m:oMathPara xmlns:m="http://schemas.openxmlformats.org/officeDocument/2006/math">
+                    <m:oMathParaPr>
+                      <m:jc m:val="center"/>
+                    </m:oMathParaPr>
+                    <m:oMath>
+                      <m:r>
+                        <m:t> </m:t>
+                      </m:r>
+                    </m:oMath>
+                  </m:oMathPara>
+                </a14:m>
+              </a:p>
+              <a:p>
+                <a:pPr lvl="0" marL="0" indent="0">
+                  <a:buNone/>
+                </a:pPr>
                 <a:r>
                   <a:rPr/>
                   <a:t>Note: </a:t>
@@ -26669,7 +26843,7 @@
 </p:sld>
 </file>
 
-<file path=ppt/slides/slide74.xml><?xml version="1.0" encoding="utf-8"?>
+<file path=ppt/slides/slide75.xml><?xml version="1.0" encoding="utf-8"?>
 <p:sld xmlns:a="http://schemas.openxmlformats.org/drawingml/2006/main" xmlns:r="http://schemas.openxmlformats.org/officeDocument/2006/relationships" xmlns:p="http://schemas.openxmlformats.org/presentationml/2006/main">
   <p:cSld>
     <p:spTree>
@@ -26947,173 +27121,8 @@
                 </a:pPr>
                 <a:r>
                   <a:rPr/>
-                  <a:t>Convince yourself this is the same thing:</a:t>
-                </a:r>
-              </a:p>
-              <a:p>
-                <a:pPr lvl="1"/>
-                <a:r>
-                  <a:rPr/>
-                  <a:t>set </a:t>
-                </a:r>
-                <a14:m>
-                  <m:oMath xmlns:m="http://schemas.openxmlformats.org/officeDocument/2006/math">
-                    <m:r>
-                      <m:t>a</m:t>
-                    </m:r>
-                    <m:r>
-                      <m:t>(</m:t>
-                    </m:r>
-                    <m:r>
-                      <m:t>ϕ</m:t>
-                    </m:r>
-                    <m:r>
-                      <m:t>)</m:t>
-                    </m:r>
-                    <m:r>
-                      <m:t>=</m:t>
-                    </m:r>
-                    <m:r>
-                      <m:t>1</m:t>
-                    </m:r>
-                  </m:oMath>
-                </a14:m>
-                <a:r>
-                  <a:rPr/>
-                  <a:t> (effectively get rid of this parameter)</a:t>
-                </a:r>
-              </a:p>
-              <a:p>
-                <a:pPr lvl="1"/>
-                <a:r>
-                  <a:rPr/>
-                  <a:t>set </a:t>
-                </a:r>
-                <a14:m>
-                  <m:oMath xmlns:m="http://schemas.openxmlformats.org/officeDocument/2006/math">
-                    <m:r>
-                      <m:t>c</m:t>
-                    </m:r>
-                    <m:r>
-                      <m:t>(</m:t>
-                    </m:r>
-                    <m:r>
-                      <m:t>y</m:t>
-                    </m:r>
-                    <m:r>
-                      <m:t>,</m:t>
-                    </m:r>
-                    <m:r>
-                      <m:t>ϕ</m:t>
-                    </m:r>
-                    <m:r>
-                      <m:t>)</m:t>
-                    </m:r>
-                    <m:r>
-                      <m:t>=</m:t>
-                    </m:r>
-                    <m:r>
-                      <m:rPr>
-                        <m:sty m:val="p"/>
-                      </m:rPr>
-                      <m:t>log</m:t>
-                    </m:r>
-                    <m:r>
-                      <m:t> </m:t>
-                    </m:r>
-                    <m:r>
-                      <m:t>h</m:t>
-                    </m:r>
-                    <m:r>
-                      <m:t>(</m:t>
-                    </m:r>
-                    <m:r>
-                      <m:t>y</m:t>
-                    </m:r>
-                    <m:r>
-                      <m:t>)</m:t>
-                    </m:r>
-                  </m:oMath>
-                </a14:m>
-              </a:p>
-              <a:p>
-                <a:pPr lvl="1"/>
-                <a:r>
-                  <a:rPr/>
-                  <a:t>set </a:t>
-                </a:r>
-                <a14:m>
-                  <m:oMath xmlns:m="http://schemas.openxmlformats.org/officeDocument/2006/math">
-                    <m:r>
-                      <m:t>−</m:t>
-                    </m:r>
-                    <m:r>
-                      <m:t>b</m:t>
-                    </m:r>
-                    <m:r>
-                      <m:t>(</m:t>
-                    </m:r>
-                    <m:r>
-                      <m:t>θ</m:t>
-                    </m:r>
-                    <m:r>
-                      <m:t>)</m:t>
-                    </m:r>
-                    <m:r>
-                      <m:t>=</m:t>
-                    </m:r>
-                    <m:r>
-                      <m:rPr>
-                        <m:sty m:val="p"/>
-                      </m:rPr>
-                      <m:t>log</m:t>
-                    </m:r>
-                    <m:r>
-                      <m:t> </m:t>
-                    </m:r>
-                    <m:r>
-                      <m:t>c</m:t>
-                    </m:r>
-                    <m:r>
-                      <m:t>(</m:t>
-                    </m:r>
-                    <m:r>
-                      <m:t>θ</m:t>
-                    </m:r>
-                    <m:r>
-                      <m:t>)</m:t>
-                    </m:r>
-                  </m:oMath>
-                </a14:m>
-              </a:p>
-              <a:p>
-                <a:pPr lvl="1"/>
-                <a:r>
-                  <a:rPr/>
-                  <a:t>set </a:t>
-                </a:r>
-                <a14:m>
-                  <m:oMath xmlns:m="http://schemas.openxmlformats.org/officeDocument/2006/math">
-                    <m:r>
-                      <m:t>y</m:t>
-                    </m:r>
-                    <m:r>
-                      <m:t>=</m:t>
-                    </m:r>
-                    <m:r>
-                      <m:t>t</m:t>
-                    </m:r>
-                    <m:r>
-                      <m:t>(</m:t>
-                    </m:r>
-                    <m:r>
-                      <m:t>y</m:t>
-                    </m:r>
-                    <m:r>
-                      <m:t>)</m:t>
-                    </m:r>
-                  </m:oMath>
-                </a14:m>
+                  <a:t>Convince yourself this is the same thing!</a:t>
+                </a:r>
               </a:p>
             </p:txBody>
           </p:sp>
@@ -27124,7 +27133,816 @@
 </p:sld>
 </file>
 
-<file path=ppt/slides/slide75.xml><?xml version="1.0" encoding="utf-8"?>
+<file path=ppt/slides/slide76.xml><?xml version="1.0" encoding="utf-8"?>
+<p:sld xmlns:a="http://schemas.openxmlformats.org/drawingml/2006/main" xmlns:r="http://schemas.openxmlformats.org/officeDocument/2006/relationships" xmlns:p="http://schemas.openxmlformats.org/presentationml/2006/main">
+  <p:cSld>
+    <p:spTree>
+      <p:nvGrpSpPr>
+        <p:cNvPr id="1" name=""/>
+        <p:cNvGrpSpPr/>
+        <p:nvPr/>
+      </p:nvGrpSpPr>
+      <p:grpSpPr>
+        <a:xfrm>
+          <a:off x="0" y="0"/>
+          <a:ext cx="0" cy="0"/>
+          <a:chOff x="0" y="0"/>
+          <a:chExt cx="0" cy="0"/>
+        </a:xfrm>
+      </p:grpSpPr>
+      <p:sp>
+        <p:nvSpPr>
+          <p:cNvPr id="2" name="Title 1">
+            <a:extLst>
+              <a:ext uri="{FF2B5EF4-FFF2-40B4-BE49-F238E27FC236}">
+                <a16:creationId xmlns:a16="http://schemas.microsoft.com/office/drawing/2014/main" id="{D6AA89D5-560C-4369-A313-7C24EDF028A0}"/>
+              </a:ext>
+            </a:extLst>
+          </p:cNvPr>
+          <p:cNvSpPr>
+            <a:spLocks noGrp="1"/>
+          </p:cNvSpPr>
+          <p:nvPr>
+            <p:ph type="title"/>
+          </p:nvPr>
+        </p:nvSpPr>
+        <p:spPr/>
+        <p:txBody>
+          <a:bodyPr/>
+          <a:lstStyle/>
+          <a:p>
+            <a:pPr lvl="0" marL="0" indent="0">
+              <a:buNone/>
+            </a:pPr>
+            <a:r>
+              <a:rPr/>
+              <a:t>Conjugate</a:t>
+            </a:r>
+            <a:r>
+              <a:rPr/>
+              <a:t> </a:t>
+            </a:r>
+            <a:r>
+              <a:rPr/>
+              <a:t>priors</a:t>
+            </a:r>
+            <a:r>
+              <a:rPr/>
+              <a:t> </a:t>
+            </a:r>
+            <a:r>
+              <a:rPr/>
+              <a:t>for</a:t>
+            </a:r>
+            <a:r>
+              <a:rPr/>
+              <a:t> </a:t>
+            </a:r>
+            <a:r>
+              <a:rPr/>
+              <a:t>exponential</a:t>
+            </a:r>
+            <a:r>
+              <a:rPr/>
+              <a:t> </a:t>
+            </a:r>
+            <a:r>
+              <a:rPr/>
+              <a:t>family</a:t>
+            </a:r>
+            <a:r>
+              <a:rPr/>
+              <a:t> </a:t>
+            </a:r>
+            <a:r>
+              <a:rPr/>
+              <a:t>distributions</a:t>
+            </a:r>
+          </a:p>
+        </p:txBody>
+      </p:sp>
+      <mc:AlternateContent xmlns:mc="http://schemas.openxmlformats.org/markup-compatibility/2006">
+        <mc:Choice xmlns:a14="http://schemas.microsoft.com/office/drawing/2010/main" Requires="a14">
+          <p:sp>
+            <p:nvSpPr>
+              <p:cNvPr id="3" name="Content Placeholder 2">
+                <a:extLst>
+                  <a:ext uri="{FF2B5EF4-FFF2-40B4-BE49-F238E27FC236}">
+                    <a16:creationId xmlns:a16="http://schemas.microsoft.com/office/drawing/2014/main" id="{288BC91F-1C76-43AE-8B2A-956D48B768BE}"/>
+                  </a:ext>
+                </a:extLst>
+              </p:cNvPr>
+              <p:cNvSpPr>
+                <a:spLocks noGrp="1"/>
+              </p:cNvSpPr>
+              <p:nvPr>
+                <p:ph idx="1"/>
+              </p:nvPr>
+            </p:nvSpPr>
+            <p:spPr/>
+            <p:txBody>
+              <a:bodyPr/>
+              <a:lstStyle/>
+              <a:p>
+                <a:pPr lvl="0" marL="0" indent="0">
+                  <a:buNone/>
+                </a:pPr>
+                <a:r>
+                  <a:rPr/>
+                  <a:t>As an aside, recall from STA6103:</a:t>
+                </a:r>
+              </a:p>
+              <a:p>
+                <a:pPr lvl="0" marL="0" indent="0">
+                  <a:buNone/>
+                </a:pPr>
+                <a:r>
+                  <a:rPr/>
+                  <a:t>Two-parameter (location </a:t>
+                </a:r>
+                <a14:m>
+                  <m:oMath xmlns:m="http://schemas.openxmlformats.org/officeDocument/2006/math">
+                    <m:r>
+                      <m:t>θ</m:t>
+                    </m:r>
+                  </m:oMath>
+                </a14:m>
+                <a:r>
+                  <a:rPr/>
+                  <a:t> and scale </a:t>
+                </a:r>
+                <a14:m>
+                  <m:oMath xmlns:m="http://schemas.openxmlformats.org/officeDocument/2006/math">
+                    <m:r>
+                      <m:t>ϕ</m:t>
+                    </m:r>
+                  </m:oMath>
+                </a14:m>
+                <a:r>
+                  <a:rPr/>
+                  <a:t>) exponential family distributions</a:t>
+                </a:r>
+              </a:p>
+              <a:p>
+                <a:pPr lvl="0" marL="0" indent="0">
+                  <a:buNone/>
+                </a:pPr>
+                <a14:m>
+                  <m:oMathPara xmlns:m="http://schemas.openxmlformats.org/officeDocument/2006/math">
+                    <m:oMathParaPr>
+                      <m:jc m:val="center"/>
+                    </m:oMathParaPr>
+                    <m:oMath>
+                      <m:r>
+                        <m:t>f</m:t>
+                      </m:r>
+                      <m:r>
+                        <m:t>(</m:t>
+                      </m:r>
+                      <m:r>
+                        <m:t>y</m:t>
+                      </m:r>
+                      <m:r>
+                        <m:t>|</m:t>
+                      </m:r>
+                      <m:r>
+                        <m:t>θ</m:t>
+                      </m:r>
+                      <m:r>
+                        <m:t>,</m:t>
+                      </m:r>
+                      <m:r>
+                        <m:t>ϕ</m:t>
+                      </m:r>
+                      <m:r>
+                        <m:t>)</m:t>
+                      </m:r>
+                      <m:r>
+                        <m:t>=</m:t>
+                      </m:r>
+                      <m:r>
+                        <m:t>e</m:t>
+                      </m:r>
+                      <m:r>
+                        <m:t>x</m:t>
+                      </m:r>
+                      <m:r>
+                        <m:t>p</m:t>
+                      </m:r>
+                      <m:d>
+                        <m:dPr>
+                          <m:begChr m:val="("/>
+                          <m:endChr m:val=")"/>
+                          <m:grow/>
+                        </m:dPr>
+                        <m:e>
+                          <m:f>
+                            <m:fPr>
+                              <m:type m:val="bar"/>
+                            </m:fPr>
+                            <m:num>
+                              <m:r>
+                                <m:t>y</m:t>
+                              </m:r>
+                              <m:r>
+                                <m:t>θ</m:t>
+                              </m:r>
+                              <m:r>
+                                <m:t>−</m:t>
+                              </m:r>
+                              <m:r>
+                                <m:t>b</m:t>
+                              </m:r>
+                              <m:r>
+                                <m:t>(</m:t>
+                              </m:r>
+                              <m:r>
+                                <m:t>θ</m:t>
+                              </m:r>
+                              <m:r>
+                                <m:t>)</m:t>
+                              </m:r>
+                            </m:num>
+                            <m:den>
+                              <m:r>
+                                <m:t>a</m:t>
+                              </m:r>
+                              <m:r>
+                                <m:t>(</m:t>
+                              </m:r>
+                              <m:r>
+                                <m:t>ϕ</m:t>
+                              </m:r>
+                              <m:r>
+                                <m:t>)</m:t>
+                              </m:r>
+                            </m:den>
+                          </m:f>
+                          <m:r>
+                            <m:t>+</m:t>
+                          </m:r>
+                          <m:r>
+                            <m:t>c</m:t>
+                          </m:r>
+                          <m:r>
+                            <m:t>(</m:t>
+                          </m:r>
+                          <m:r>
+                            <m:t>y</m:t>
+                          </m:r>
+                          <m:r>
+                            <m:t>,</m:t>
+                          </m:r>
+                          <m:r>
+                            <m:t>ϕ</m:t>
+                          </m:r>
+                          <m:r>
+                            <m:t>)</m:t>
+                          </m:r>
+                        </m:e>
+                      </m:d>
+                    </m:oMath>
+                  </m:oMathPara>
+                </a14:m>
+              </a:p>
+              <a:p>
+                <a:pPr lvl="0" marL="0" indent="0">
+                  <a:buNone/>
+                </a:pPr>
+                <a:r>
+                  <a:rPr/>
+                  <a:t>Convince yourself this is the same thing!</a:t>
+                </a:r>
+              </a:p>
+              <a:p>
+                <a:pPr lvl="1"/>
+                <a:r>
+                  <a:rPr/>
+                  <a:t>set </a:t>
+                </a:r>
+                <a14:m>
+                  <m:oMath xmlns:m="http://schemas.openxmlformats.org/officeDocument/2006/math">
+                    <m:r>
+                      <m:t>a</m:t>
+                    </m:r>
+                    <m:r>
+                      <m:t>(</m:t>
+                    </m:r>
+                    <m:r>
+                      <m:t>ϕ</m:t>
+                    </m:r>
+                    <m:r>
+                      <m:t>)</m:t>
+                    </m:r>
+                    <m:r>
+                      <m:t>=</m:t>
+                    </m:r>
+                    <m:r>
+                      <m:t>1</m:t>
+                    </m:r>
+                  </m:oMath>
+                </a14:m>
+                <a:r>
+                  <a:rPr/>
+                  <a:t> (effectively get rid of this parameter)</a:t>
+                </a:r>
+              </a:p>
+              <a:p>
+                <a:pPr lvl="1"/>
+                <a:r>
+                  <a:rPr/>
+                  <a:t>set </a:t>
+                </a:r>
+                <a14:m>
+                  <m:oMath xmlns:m="http://schemas.openxmlformats.org/officeDocument/2006/math">
+                    <m:r>
+                      <m:t>c</m:t>
+                    </m:r>
+                    <m:r>
+                      <m:t>(</m:t>
+                    </m:r>
+                    <m:r>
+                      <m:t>y</m:t>
+                    </m:r>
+                    <m:r>
+                      <m:t>,</m:t>
+                    </m:r>
+                    <m:r>
+                      <m:t>ϕ</m:t>
+                    </m:r>
+                    <m:r>
+                      <m:t>)</m:t>
+                    </m:r>
+                    <m:r>
+                      <m:t>=</m:t>
+                    </m:r>
+                    <m:r>
+                      <m:rPr>
+                        <m:sty m:val="p"/>
+                      </m:rPr>
+                      <m:t>log</m:t>
+                    </m:r>
+                    <m:r>
+                      <m:t> </m:t>
+                    </m:r>
+                    <m:r>
+                      <m:t>h</m:t>
+                    </m:r>
+                    <m:r>
+                      <m:t>(</m:t>
+                    </m:r>
+                    <m:r>
+                      <m:t>y</m:t>
+                    </m:r>
+                    <m:r>
+                      <m:t>)</m:t>
+                    </m:r>
+                  </m:oMath>
+                </a14:m>
+              </a:p>
+              <a:p>
+                <a:pPr lvl="1"/>
+                <a:r>
+                  <a:rPr/>
+                  <a:t>set </a:t>
+                </a:r>
+                <a14:m>
+                  <m:oMath xmlns:m="http://schemas.openxmlformats.org/officeDocument/2006/math">
+                    <m:r>
+                      <m:t>−</m:t>
+                    </m:r>
+                    <m:r>
+                      <m:t>b</m:t>
+                    </m:r>
+                    <m:r>
+                      <m:t>(</m:t>
+                    </m:r>
+                    <m:r>
+                      <m:t>θ</m:t>
+                    </m:r>
+                    <m:r>
+                      <m:t>)</m:t>
+                    </m:r>
+                    <m:r>
+                      <m:t>=</m:t>
+                    </m:r>
+                    <m:r>
+                      <m:rPr>
+                        <m:sty m:val="p"/>
+                      </m:rPr>
+                      <m:t>log</m:t>
+                    </m:r>
+                    <m:r>
+                      <m:t> </m:t>
+                    </m:r>
+                    <m:r>
+                      <m:t>c</m:t>
+                    </m:r>
+                    <m:r>
+                      <m:t>(</m:t>
+                    </m:r>
+                    <m:r>
+                      <m:t>θ</m:t>
+                    </m:r>
+                    <m:r>
+                      <m:t>)</m:t>
+                    </m:r>
+                  </m:oMath>
+                </a14:m>
+              </a:p>
+              <a:p>
+                <a:pPr lvl="1"/>
+                <a:r>
+                  <a:rPr/>
+                  <a:t>set </a:t>
+                </a:r>
+                <a14:m>
+                  <m:oMath xmlns:m="http://schemas.openxmlformats.org/officeDocument/2006/math">
+                    <m:r>
+                      <m:t>y</m:t>
+                    </m:r>
+                    <m:r>
+                      <m:t>=</m:t>
+                    </m:r>
+                    <m:r>
+                      <m:t>t</m:t>
+                    </m:r>
+                    <m:r>
+                      <m:t>(</m:t>
+                    </m:r>
+                    <m:r>
+                      <m:t>y</m:t>
+                    </m:r>
+                    <m:r>
+                      <m:t>)</m:t>
+                    </m:r>
+                  </m:oMath>
+                </a14:m>
+              </a:p>
+            </p:txBody>
+          </p:sp>
+        </mc:Choice>
+      </mc:AlternateContent>
+    </p:spTree>
+  </p:cSld>
+</p:sld>
+</file>
+
+<file path=ppt/slides/slide77.xml><?xml version="1.0" encoding="utf-8"?>
+<p:sld xmlns:a="http://schemas.openxmlformats.org/drawingml/2006/main" xmlns:r="http://schemas.openxmlformats.org/officeDocument/2006/relationships" xmlns:p="http://schemas.openxmlformats.org/presentationml/2006/main">
+  <p:cSld>
+    <p:spTree>
+      <p:nvGrpSpPr>
+        <p:cNvPr id="1" name=""/>
+        <p:cNvGrpSpPr/>
+        <p:nvPr/>
+      </p:nvGrpSpPr>
+      <p:grpSpPr>
+        <a:xfrm>
+          <a:off x="0" y="0"/>
+          <a:ext cx="0" cy="0"/>
+          <a:chOff x="0" y="0"/>
+          <a:chExt cx="0" cy="0"/>
+        </a:xfrm>
+      </p:grpSpPr>
+      <p:sp>
+        <p:nvSpPr>
+          <p:cNvPr id="2" name="Title 1">
+            <a:extLst>
+              <a:ext uri="{FF2B5EF4-FFF2-40B4-BE49-F238E27FC236}">
+                <a16:creationId xmlns:a16="http://schemas.microsoft.com/office/drawing/2014/main" id="{D6AA89D5-560C-4369-A313-7C24EDF028A0}"/>
+              </a:ext>
+            </a:extLst>
+          </p:cNvPr>
+          <p:cNvSpPr>
+            <a:spLocks noGrp="1"/>
+          </p:cNvSpPr>
+          <p:nvPr>
+            <p:ph type="title"/>
+          </p:nvPr>
+        </p:nvSpPr>
+        <p:spPr/>
+        <p:txBody>
+          <a:bodyPr/>
+          <a:lstStyle/>
+          <a:p>
+            <a:pPr lvl="0" marL="0" indent="0">
+              <a:buNone/>
+            </a:pPr>
+            <a:r>
+              <a:rPr/>
+              <a:t>Priors</a:t>
+            </a:r>
+            <a:r>
+              <a:rPr/>
+              <a:t> </a:t>
+            </a:r>
+            <a:r>
+              <a:rPr/>
+              <a:t>-</a:t>
+            </a:r>
+            <a:r>
+              <a:rPr/>
+              <a:t> </a:t>
+            </a:r>
+            <a:r>
+              <a:rPr/>
+              <a:t>how</a:t>
+            </a:r>
+            <a:r>
+              <a:rPr/>
+              <a:t> </a:t>
+            </a:r>
+            <a:r>
+              <a:rPr/>
+              <a:t>to</a:t>
+            </a:r>
+            <a:r>
+              <a:rPr/>
+              <a:t> </a:t>
+            </a:r>
+            <a:r>
+              <a:rPr/>
+              <a:t>choose</a:t>
+            </a:r>
+            <a:r>
+              <a:rPr/>
+              <a:t> </a:t>
+            </a:r>
+            <a:r>
+              <a:rPr/>
+              <a:t>them</a:t>
+            </a:r>
+          </a:p>
+        </p:txBody>
+      </p:sp>
+      <mc:AlternateContent xmlns:mc="http://schemas.openxmlformats.org/markup-compatibility/2006">
+        <mc:Choice xmlns:a14="http://schemas.microsoft.com/office/drawing/2010/main" Requires="a14">
+          <p:sp>
+            <p:nvSpPr>
+              <p:cNvPr id="3" name="Content Placeholder 2">
+                <a:extLst>
+                  <a:ext uri="{FF2B5EF4-FFF2-40B4-BE49-F238E27FC236}">
+                    <a16:creationId xmlns:a16="http://schemas.microsoft.com/office/drawing/2014/main" id="{288BC91F-1C76-43AE-8B2A-956D48B768BE}"/>
+                  </a:ext>
+                </a:extLst>
+              </p:cNvPr>
+              <p:cNvSpPr>
+                <a:spLocks noGrp="1"/>
+              </p:cNvSpPr>
+              <p:nvPr>
+                <p:ph idx="1"/>
+              </p:nvPr>
+            </p:nvSpPr>
+            <p:spPr/>
+            <p:txBody>
+              <a:bodyPr/>
+              <a:lstStyle/>
+              <a:p>
+                <a:pPr lvl="1"/>
+                <a:r>
+                  <a:rPr/>
+                  <a:t>The shape of the prior shows the “belief weights” we give for all possible values before we look at the data.</a:t>
+                </a:r>
+              </a:p>
+              <a:p>
+                <a:pPr lvl="1"/>
+                <a:r>
+                  <a:rPr/>
+                  <a:t>The prior </a:t>
+                </a:r>
+                <a:r>
+                  <a:rPr b="1"/>
+                  <a:t>must not</a:t>
+                </a:r>
+                <a:r>
+                  <a:rPr/>
+                  <a:t> come from the data. The posterior is proportional to </a:t>
+                </a:r>
+                <a14:m>
+                  <m:oMath xmlns:m="http://schemas.openxmlformats.org/officeDocument/2006/math">
+                    <m:r>
+                      <m:t>p</m:t>
+                    </m:r>
+                    <m:r>
+                      <m:t>r</m:t>
+                    </m:r>
+                    <m:r>
+                      <m:t>i</m:t>
+                    </m:r>
+                    <m:r>
+                      <m:t>o</m:t>
+                    </m:r>
+                    <m:r>
+                      <m:t>r</m:t>
+                    </m:r>
+                    <m:r>
+                      <m:t> </m:t>
+                    </m:r>
+                    <m:r>
+                      <m:t>×</m:t>
+                    </m:r>
+                    <m:r>
+                      <m:t> </m:t>
+                    </m:r>
+                    <m:r>
+                      <m:t>l</m:t>
+                    </m:r>
+                    <m:r>
+                      <m:t>i</m:t>
+                    </m:r>
+                    <m:r>
+                      <m:t>k</m:t>
+                    </m:r>
+                    <m:r>
+                      <m:t>e</m:t>
+                    </m:r>
+                    <m:r>
+                      <m:t>l</m:t>
+                    </m:r>
+                    <m:r>
+                      <m:t>i</m:t>
+                    </m:r>
+                    <m:r>
+                      <m:t>h</m:t>
+                    </m:r>
+                    <m:r>
+                      <m:t>o</m:t>
+                    </m:r>
+                    <m:r>
+                      <m:t>o</m:t>
+                    </m:r>
+                    <m:r>
+                      <m:t>d</m:t>
+                    </m:r>
+                  </m:oMath>
+                </a14:m>
+                <a:r>
+                  <a:rPr/>
+                  <a:t>. The multiplication means the prior and likelihood must be independent!</a:t>
+                </a:r>
+              </a:p>
+              <a:p>
+                <a:pPr lvl="1"/>
+                <a:r>
+                  <a:rPr/>
+                  <a:t>If you don’t want to favor any one value over another, use a non-informative or diffuse prior, e.g. the uniform prior.</a:t>
+                </a:r>
+              </a:p>
+              <a:p>
+                <a:pPr lvl="1"/>
+                <a:r>
+                  <a:rPr/>
+                  <a:t>The choice of prior is not crucial. All priors that have reasonable probability over the realistic range of the data will have quite similar posteriors. We have seen that with enough data, the likelihood will have the greater contribution to the posterior. Priors can , however, restrict the range of the posterior distribution.</a:t>
+                </a:r>
+              </a:p>
+            </p:txBody>
+          </p:sp>
+        </mc:Choice>
+      </mc:AlternateContent>
+    </p:spTree>
+  </p:cSld>
+</p:sld>
+</file>
+
+<file path=ppt/slides/slide78.xml><?xml version="1.0" encoding="utf-8"?>
+<p:sld xmlns:a="http://schemas.openxmlformats.org/drawingml/2006/main" xmlns:r="http://schemas.openxmlformats.org/officeDocument/2006/relationships" xmlns:p="http://schemas.openxmlformats.org/presentationml/2006/main">
+  <p:cSld>
+    <p:spTree>
+      <p:nvGrpSpPr>
+        <p:cNvPr id="1" name=""/>
+        <p:cNvGrpSpPr/>
+        <p:nvPr/>
+      </p:nvGrpSpPr>
+      <p:grpSpPr>
+        <a:xfrm>
+          <a:off x="0" y="0"/>
+          <a:ext cx="0" cy="0"/>
+          <a:chOff x="0" y="0"/>
+          <a:chExt cx="0" cy="0"/>
+        </a:xfrm>
+      </p:grpSpPr>
+      <p:sp>
+        <p:nvSpPr>
+          <p:cNvPr id="2" name="Title 1">
+            <a:extLst>
+              <a:ext uri="{FF2B5EF4-FFF2-40B4-BE49-F238E27FC236}">
+                <a16:creationId xmlns:a16="http://schemas.microsoft.com/office/drawing/2014/main" id="{D6AA89D5-560C-4369-A313-7C24EDF028A0}"/>
+              </a:ext>
+            </a:extLst>
+          </p:cNvPr>
+          <p:cNvSpPr>
+            <a:spLocks noGrp="1"/>
+          </p:cNvSpPr>
+          <p:nvPr>
+            <p:ph type="title"/>
+          </p:nvPr>
+        </p:nvSpPr>
+        <p:spPr/>
+        <p:txBody>
+          <a:bodyPr/>
+          <a:lstStyle/>
+          <a:p>
+            <a:pPr lvl="0" marL="0" indent="0">
+              <a:buNone/>
+            </a:pPr>
+            <a:r>
+              <a:rPr/>
+              <a:t>Priors</a:t>
+            </a:r>
+            <a:r>
+              <a:rPr/>
+              <a:t> </a:t>
+            </a:r>
+            <a:r>
+              <a:rPr/>
+              <a:t>-</a:t>
+            </a:r>
+            <a:r>
+              <a:rPr/>
+              <a:t> </a:t>
+            </a:r>
+            <a:r>
+              <a:rPr/>
+              <a:t>how</a:t>
+            </a:r>
+            <a:r>
+              <a:rPr/>
+              <a:t> </a:t>
+            </a:r>
+            <a:r>
+              <a:rPr/>
+              <a:t>to</a:t>
+            </a:r>
+            <a:r>
+              <a:rPr/>
+              <a:t> </a:t>
+            </a:r>
+            <a:r>
+              <a:rPr/>
+              <a:t>choose</a:t>
+            </a:r>
+            <a:r>
+              <a:rPr/>
+              <a:t> </a:t>
+            </a:r>
+            <a:r>
+              <a:rPr/>
+              <a:t>them</a:t>
+            </a:r>
+            <a:r>
+              <a:rPr/>
+              <a:t> </a:t>
+            </a:r>
+            <a:r>
+              <a:rPr/>
+              <a:t>(cont’d)</a:t>
+            </a:r>
+          </a:p>
+        </p:txBody>
+      </p:sp>
+      <p:sp>
+        <p:nvSpPr>
+          <p:cNvPr id="3" name="Content Placeholder 2">
+            <a:extLst>
+              <a:ext uri="{FF2B5EF4-FFF2-40B4-BE49-F238E27FC236}">
+                <a16:creationId xmlns:a16="http://schemas.microsoft.com/office/drawing/2014/main" id="{288BC91F-1C76-43AE-8B2A-956D48B768BE}"/>
+              </a:ext>
+            </a:extLst>
+          </p:cNvPr>
+          <p:cNvSpPr>
+            <a:spLocks noGrp="1"/>
+          </p:cNvSpPr>
+          <p:nvPr>
+            <p:ph idx="1"/>
+          </p:nvPr>
+        </p:nvSpPr>
+        <p:spPr/>
+        <p:txBody>
+          <a:bodyPr/>
+          <a:lstStyle/>
+          <a:p>
+            <a:pPr lvl="1"/>
+            <a:r>
+              <a:rPr/>
+              <a:t>Conjugate priors simplify calculations greatly as the posterior will be of the same family.</a:t>
+            </a:r>
+          </a:p>
+          <a:p>
+            <a:pPr lvl="1"/>
+            <a:r>
+              <a:rPr/>
+              <a:t>So identify the family of conjugate priors for your sampling model, then pick the one with a distribution function whose shape matches your beliefs closest.</a:t>
+            </a:r>
+          </a:p>
+        </p:txBody>
+      </p:sp>
+    </p:spTree>
+  </p:cSld>
+</p:sld>
+</file>
+
+<file path=ppt/slides/slide79.xml><?xml version="1.0" encoding="utf-8"?>
 <p:sld xmlns:a="http://schemas.openxmlformats.org/drawingml/2006/main" xmlns:r="http://schemas.openxmlformats.org/officeDocument/2006/relationships" xmlns:p="http://schemas.openxmlformats.org/presentationml/2006/main">
   <p:cSld>
     <p:spTree>

</xml_diff>